<commit_message>
FIXED pop up text
</commit_message>
<xml_diff>
--- a/by next week.pptx
+++ b/by next week.pptx
@@ -7,8 +7,9 @@
   <p:sldIdLst>
     <p:sldId id="256" r:id="rId2"/>
     <p:sldId id="257" r:id="rId3"/>
-    <p:sldId id="259" r:id="rId4"/>
-    <p:sldId id="258" r:id="rId5"/>
+    <p:sldId id="258" r:id="rId4"/>
+    <p:sldId id="259" r:id="rId5"/>
+    <p:sldId id="260" r:id="rId6"/>
   </p:sldIdLst>
   <p:sldSz cx="12192000" cy="6858000"/>
   <p:notesSz cx="6858000" cy="9144000"/>
@@ -6287,15 +6288,7 @@
           <a:p>
             <a:r>
               <a:rPr lang="en-AU" dirty="0" smtClean="0"/>
-              <a:t>Complete </a:t>
-            </a:r>
-            <a:r>
-              <a:rPr lang="en-AU" dirty="0" smtClean="0"/>
-              <a:t>all </a:t>
-            </a:r>
-            <a:r>
-              <a:rPr lang="en-AU" dirty="0" smtClean="0"/>
-              <a:t>tasks you have set yourself.</a:t>
+              <a:t>Complete all tasks you have set yourself.</a:t>
             </a:r>
           </a:p>
           <a:p>
@@ -6313,29 +6306,13 @@
           <a:p>
             <a:r>
               <a:rPr lang="en-AU" dirty="0" smtClean="0"/>
-              <a:t>What </a:t>
-            </a:r>
+              <a:t>What I did this week</a:t>
+            </a:r>
+          </a:p>
+          <a:p>
             <a:r>
               <a:rPr lang="en-AU" dirty="0" smtClean="0"/>
-              <a:t>I </a:t>
-            </a:r>
-            <a:r>
-              <a:rPr lang="en-AU" dirty="0" smtClean="0"/>
-              <a:t>did this week</a:t>
-            </a:r>
-          </a:p>
-          <a:p>
-            <a:r>
-              <a:rPr lang="en-AU" dirty="0" smtClean="0"/>
-              <a:t>How </a:t>
-            </a:r>
-            <a:r>
-              <a:rPr lang="en-AU" dirty="0" smtClean="0"/>
-              <a:t>did it </a:t>
-            </a:r>
-            <a:r>
-              <a:rPr lang="en-AU" dirty="0" smtClean="0"/>
-              <a:t>works</a:t>
+              <a:t>How did it works</a:t>
             </a:r>
           </a:p>
           <a:p>
@@ -6349,11 +6326,7 @@
             </a:r>
             <a:r>
               <a:rPr lang="en-AU" dirty="0" smtClean="0"/>
-              <a:t> </a:t>
-            </a:r>
-            <a:r>
-              <a:rPr lang="en-AU" dirty="0" smtClean="0"/>
-              <a:t>think it needs</a:t>
+              <a:t> think it needs</a:t>
             </a:r>
           </a:p>
           <a:p>
@@ -6410,14 +6383,7 @@
           <a:bodyPr/>
           <a:lstStyle/>
           <a:p>
-            <a:r>
-              <a:rPr lang="en-AU" dirty="0" smtClean="0"/>
-              <a:t>COMPLETE_ just script not working…</a:t>
-            </a:r>
-            <a:br>
-              <a:rPr lang="en-AU" dirty="0" smtClean="0"/>
-            </a:br>
-            <a:endParaRPr lang="en-AU" dirty="0"/>
+            <a:endParaRPr lang="en-AU"/>
           </a:p>
         </p:txBody>
       </p:sp>
@@ -6437,47 +6403,32 @@
           <a:lstStyle/>
           <a:p>
             <a:r>
-              <a:rPr lang="en-AU" dirty="0" smtClean="0"/>
-              <a:t>Definitely sticking with my old project for a hack n slash to CHARGING an attack…</a:t>
-            </a:r>
-          </a:p>
-          <a:p>
-            <a:r>
-              <a:rPr lang="en-AU" dirty="0" smtClean="0"/>
-              <a:t>What I did this week, research for UI script, numbers when strike, got basics but not working as intended.</a:t>
-            </a:r>
-          </a:p>
-          <a:p>
-            <a:r>
-              <a:rPr lang="en-AU" dirty="0" smtClean="0"/>
-              <a:t>Did fix the weapon collider, works well.</a:t>
-            </a:r>
-          </a:p>
-          <a:p>
-            <a:r>
-              <a:rPr lang="en-AU" dirty="0" smtClean="0"/>
-              <a:t>I think it needs charged attack and attack while in motion….</a:t>
-            </a:r>
-          </a:p>
-          <a:p>
-            <a:r>
-              <a:rPr lang="en-AU" dirty="0" smtClean="0"/>
-              <a:t>I had an idea, TO have colour change when charging a longer time to accentuate the charge for the aesthetic of quality of life, KILLING with higher </a:t>
-            </a:r>
-            <a:r>
-              <a:rPr lang="en-AU" dirty="0" err="1" smtClean="0"/>
-              <a:t>dmg</a:t>
-            </a:r>
-            <a:r>
-              <a:rPr lang="en-AU" smtClean="0"/>
-              <a:t>. </a:t>
+              <a:rPr lang="en-AU" dirty="0">
+                <a:hlinkClick r:id="rId2"/>
+              </a:rPr>
+              <a:t>https://www.youtube.com/watch?v=_</a:t>
+            </a:r>
+            <a:r>
+              <a:rPr lang="en-AU" dirty="0" smtClean="0">
+                <a:hlinkClick r:id="rId2"/>
+              </a:rPr>
+              <a:t>ICCSDmLCX4</a:t>
             </a:r>
             <a:endParaRPr lang="en-AU" dirty="0" smtClean="0"/>
           </a:p>
           <a:p>
-            <a:endParaRPr lang="en-AU" dirty="0" smtClean="0"/>
-          </a:p>
-          <a:p>
+            <a:r>
+              <a:rPr lang="en-AU" dirty="0">
+                <a:hlinkClick r:id="rId3"/>
+              </a:rPr>
+              <a:t>https://</a:t>
+            </a:r>
+            <a:r>
+              <a:rPr lang="en-AU" dirty="0" smtClean="0">
+                <a:hlinkClick r:id="rId3"/>
+              </a:rPr>
+              <a:t>www.youtube.com/watch?v=LkN4HvlPN84</a:t>
+            </a:r>
             <a:endParaRPr lang="en-AU" dirty="0" smtClean="0"/>
           </a:p>
           <a:p>
@@ -6488,7 +6439,7 @@
     </p:spTree>
     <p:extLst>
       <p:ext uri="{BB962C8B-B14F-4D97-AF65-F5344CB8AC3E}">
-        <p14:creationId xmlns:p14="http://schemas.microsoft.com/office/powerpoint/2010/main" val="574802093"/>
+        <p14:creationId xmlns:p14="http://schemas.microsoft.com/office/powerpoint/2010/main" val="3239950761"/>
       </p:ext>
     </p:extLst>
   </p:cSld>
@@ -6530,7 +6481,14 @@
           <a:bodyPr/>
           <a:lstStyle/>
           <a:p>
-            <a:endParaRPr lang="en-AU"/>
+            <a:r>
+              <a:rPr lang="en-AU" dirty="0" smtClean="0"/>
+              <a:t>COMPLETE_ just script not working…</a:t>
+            </a:r>
+            <a:br>
+              <a:rPr lang="en-AU" dirty="0" smtClean="0"/>
+            </a:br>
+            <a:endParaRPr lang="en-AU" dirty="0"/>
           </a:p>
         </p:txBody>
       </p:sp>
@@ -6550,32 +6508,47 @@
           <a:lstStyle/>
           <a:p>
             <a:r>
-              <a:rPr lang="en-AU" dirty="0">
-                <a:hlinkClick r:id="rId2"/>
-              </a:rPr>
-              <a:t>https://www.youtube.com/watch?v=_</a:t>
-            </a:r>
-            <a:r>
-              <a:rPr lang="en-AU" dirty="0" smtClean="0">
-                <a:hlinkClick r:id="rId2"/>
-              </a:rPr>
-              <a:t>ICCSDmLCX4</a:t>
+              <a:rPr lang="en-AU" dirty="0" smtClean="0"/>
+              <a:t>Definitely sticking with my old project for a hack n slash to CHARGING an attack…</a:t>
+            </a:r>
+          </a:p>
+          <a:p>
+            <a:r>
+              <a:rPr lang="en-AU" dirty="0" smtClean="0"/>
+              <a:t>What I did this week, research for UI script, numbers when strike, got basics but not working as intended.</a:t>
+            </a:r>
+          </a:p>
+          <a:p>
+            <a:r>
+              <a:rPr lang="en-AU" dirty="0" smtClean="0"/>
+              <a:t>Did fix the weapon collider, works well.</a:t>
+            </a:r>
+          </a:p>
+          <a:p>
+            <a:r>
+              <a:rPr lang="en-AU" dirty="0" smtClean="0"/>
+              <a:t>I think it needs charged attack and attack while in motion….</a:t>
+            </a:r>
+          </a:p>
+          <a:p>
+            <a:r>
+              <a:rPr lang="en-AU" dirty="0" smtClean="0"/>
+              <a:t>I had an idea, TO have colour change when charging a longer time to accentuate the charge for the aesthetic of quality of life, KILLING with higher </a:t>
+            </a:r>
+            <a:r>
+              <a:rPr lang="en-AU" dirty="0" err="1" smtClean="0"/>
+              <a:t>dmg</a:t>
+            </a:r>
+            <a:r>
+              <a:rPr lang="en-AU" smtClean="0"/>
+              <a:t>. </a:t>
             </a:r>
             <a:endParaRPr lang="en-AU" dirty="0" smtClean="0"/>
           </a:p>
           <a:p>
-            <a:r>
-              <a:rPr lang="en-AU" dirty="0">
-                <a:hlinkClick r:id="rId3"/>
-              </a:rPr>
-              <a:t>https://</a:t>
-            </a:r>
-            <a:r>
-              <a:rPr lang="en-AU" dirty="0" smtClean="0">
-                <a:hlinkClick r:id="rId3"/>
-              </a:rPr>
-              <a:t>www.youtube.com/watch?v=LkN4HvlPN84</a:t>
-            </a:r>
+            <a:endParaRPr lang="en-AU" dirty="0" smtClean="0"/>
+          </a:p>
+          <a:p>
             <a:endParaRPr lang="en-AU" dirty="0" smtClean="0"/>
           </a:p>
           <a:p>
@@ -6586,7 +6559,89 @@
     </p:spTree>
     <p:extLst>
       <p:ext uri="{BB962C8B-B14F-4D97-AF65-F5344CB8AC3E}">
-        <p14:creationId xmlns:p14="http://schemas.microsoft.com/office/powerpoint/2010/main" val="3239950761"/>
+        <p14:creationId xmlns:p14="http://schemas.microsoft.com/office/powerpoint/2010/main" val="574802093"/>
+      </p:ext>
+    </p:extLst>
+  </p:cSld>
+  <p:clrMapOvr>
+    <a:masterClrMapping/>
+  </p:clrMapOvr>
+</p:sld>
+</file>
+
+<file path=ppt/slides/slide5.xml><?xml version="1.0" encoding="utf-8"?>
+<p:sld xmlns:a="http://schemas.openxmlformats.org/drawingml/2006/main" xmlns:r="http://schemas.openxmlformats.org/officeDocument/2006/relationships" xmlns:p="http://schemas.openxmlformats.org/presentationml/2006/main">
+  <p:cSld>
+    <p:spTree>
+      <p:nvGrpSpPr>
+        <p:cNvPr id="1" name=""/>
+        <p:cNvGrpSpPr/>
+        <p:nvPr/>
+      </p:nvGrpSpPr>
+      <p:grpSpPr>
+        <a:xfrm>
+          <a:off x="0" y="0"/>
+          <a:ext cx="0" cy="0"/>
+          <a:chOff x="0" y="0"/>
+          <a:chExt cx="0" cy="0"/>
+        </a:xfrm>
+      </p:grpSpPr>
+      <p:sp>
+        <p:nvSpPr>
+          <p:cNvPr id="2" name="Title 1"/>
+          <p:cNvSpPr>
+            <a:spLocks noGrp="1"/>
+          </p:cNvSpPr>
+          <p:nvPr>
+            <p:ph type="title"/>
+          </p:nvPr>
+        </p:nvSpPr>
+        <p:spPr/>
+        <p:txBody>
+          <a:bodyPr/>
+          <a:lstStyle/>
+          <a:p>
+            <a:endParaRPr lang="en-AU"/>
+          </a:p>
+        </p:txBody>
+      </p:sp>
+      <p:sp>
+        <p:nvSpPr>
+          <p:cNvPr id="3" name="Content Placeholder 2"/>
+          <p:cNvSpPr>
+            <a:spLocks noGrp="1"/>
+          </p:cNvSpPr>
+          <p:nvPr>
+            <p:ph idx="1"/>
+          </p:nvPr>
+        </p:nvSpPr>
+        <p:spPr/>
+        <p:txBody>
+          <a:bodyPr/>
+          <a:lstStyle/>
+          <a:p>
+            <a:r>
+              <a:rPr lang="en-US" dirty="0" smtClean="0"/>
+              <a:t>Blog, </a:t>
+            </a:r>
+            <a:r>
+              <a:rPr lang="en-US" dirty="0" err="1" smtClean="0"/>
+              <a:t>wordpress</a:t>
+            </a:r>
+            <a:r>
+              <a:rPr lang="en-US" smtClean="0"/>
+              <a:t> account</a:t>
+            </a:r>
+          </a:p>
+          <a:p>
+            <a:endParaRPr lang="en-AU"/>
+          </a:p>
+        </p:txBody>
+      </p:sp>
+    </p:spTree>
+    <p:extLst>
+      <p:ext uri="{BB962C8B-B14F-4D97-AF65-F5344CB8AC3E}">
+        <p14:creationId xmlns:p14="http://schemas.microsoft.com/office/powerpoint/2010/main" val="3040905021"/>
       </p:ext>
     </p:extLst>
   </p:cSld>

</xml_diff>

<commit_message>
Sprint Stuff for prototype
</commit_message>
<xml_diff>
--- a/by next week.pptx
+++ b/by next week.pptx
@@ -10,6 +10,9 @@
     <p:sldId id="258" r:id="rId4"/>
     <p:sldId id="259" r:id="rId5"/>
     <p:sldId id="260" r:id="rId6"/>
+    <p:sldId id="261" r:id="rId7"/>
+    <p:sldId id="262" r:id="rId8"/>
+    <p:sldId id="263" r:id="rId9"/>
   </p:sldIdLst>
   <p:sldSz cx="12192000" cy="6858000"/>
   <p:notesSz cx="6858000" cy="9144000"/>
@@ -302,7 +305,7 @@
           <a:p>
             <a:fld id="{4AAD347D-5ACD-4C99-B74B-A9C85AD731AF}" type="datetimeFigureOut">
               <a:rPr lang="en-US" dirty="0"/>
-              <a:t>10/11/2018</a:t>
+              <a:t>10/18/2018</a:t>
             </a:fld>
             <a:endParaRPr lang="en-US" dirty="0"/>
           </a:p>
@@ -572,7 +575,7 @@
           <a:p>
             <a:fld id="{4509A250-FF31-4206-8172-F9D3106AACB1}" type="datetimeFigureOut">
               <a:rPr lang="en-US" dirty="0"/>
-              <a:t>10/11/2018</a:t>
+              <a:t>10/18/2018</a:t>
             </a:fld>
             <a:endParaRPr lang="en-US" dirty="0"/>
           </a:p>
@@ -761,7 +764,7 @@
           <a:p>
             <a:fld id="{4509A250-FF31-4206-8172-F9D3106AACB1}" type="datetimeFigureOut">
               <a:rPr lang="en-US" dirty="0"/>
-              <a:t>10/11/2018</a:t>
+              <a:t>10/18/2018</a:t>
             </a:fld>
             <a:endParaRPr lang="en-US" dirty="0"/>
           </a:p>
@@ -1029,7 +1032,7 @@
           <a:p>
             <a:fld id="{4509A250-FF31-4206-8172-F9D3106AACB1}" type="datetimeFigureOut">
               <a:rPr lang="en-US" dirty="0"/>
-              <a:t>10/11/2018</a:t>
+              <a:t>10/18/2018</a:t>
             </a:fld>
             <a:endParaRPr lang="en-US" dirty="0"/>
           </a:p>
@@ -1365,7 +1368,7 @@
           <a:p>
             <a:fld id="{4509A250-FF31-4206-8172-F9D3106AACB1}" type="datetimeFigureOut">
               <a:rPr lang="en-US" dirty="0"/>
-              <a:t>10/11/2018</a:t>
+              <a:t>10/18/2018</a:t>
             </a:fld>
             <a:endParaRPr lang="en-US" dirty="0"/>
           </a:p>
@@ -1983,7 +1986,7 @@
           <a:p>
             <a:fld id="{4509A250-FF31-4206-8172-F9D3106AACB1}" type="datetimeFigureOut">
               <a:rPr lang="en-US" dirty="0"/>
-              <a:t>10/11/2018</a:t>
+              <a:t>10/18/2018</a:t>
             </a:fld>
             <a:endParaRPr lang="en-US" dirty="0"/>
           </a:p>
@@ -2838,7 +2841,7 @@
           <a:p>
             <a:fld id="{4509A250-FF31-4206-8172-F9D3106AACB1}" type="datetimeFigureOut">
               <a:rPr lang="en-US" dirty="0"/>
-              <a:t>10/11/2018</a:t>
+              <a:t>10/18/2018</a:t>
             </a:fld>
             <a:endParaRPr lang="en-US" dirty="0"/>
           </a:p>
@@ -3003,7 +3006,7 @@
           <a:p>
             <a:fld id="{4509A250-FF31-4206-8172-F9D3106AACB1}" type="datetimeFigureOut">
               <a:rPr lang="en-US" dirty="0"/>
-              <a:t>10/11/2018</a:t>
+              <a:t>10/18/2018</a:t>
             </a:fld>
             <a:endParaRPr lang="en-US" dirty="0"/>
           </a:p>
@@ -3178,7 +3181,7 @@
           <a:p>
             <a:fld id="{4509A250-FF31-4206-8172-F9D3106AACB1}" type="datetimeFigureOut">
               <a:rPr lang="en-US" dirty="0"/>
-              <a:t>10/11/2018</a:t>
+              <a:t>10/18/2018</a:t>
             </a:fld>
             <a:endParaRPr lang="en-US" dirty="0"/>
           </a:p>
@@ -3343,7 +3346,7 @@
           <a:p>
             <a:fld id="{4509A250-FF31-4206-8172-F9D3106AACB1}" type="datetimeFigureOut">
               <a:rPr lang="en-US" dirty="0"/>
-              <a:t>10/11/2018</a:t>
+              <a:t>10/18/2018</a:t>
             </a:fld>
             <a:endParaRPr lang="en-US" dirty="0"/>
           </a:p>
@@ -3585,7 +3588,7 @@
           <a:p>
             <a:fld id="{9796027F-7875-4030-9381-8BD8C4F21935}" type="datetimeFigureOut">
               <a:rPr lang="en-US" dirty="0"/>
-              <a:t>10/11/2018</a:t>
+              <a:t>10/18/2018</a:t>
             </a:fld>
             <a:endParaRPr lang="en-US" dirty="0"/>
           </a:p>
@@ -3872,7 +3875,7 @@
           <a:p>
             <a:fld id="{9796027F-7875-4030-9381-8BD8C4F21935}" type="datetimeFigureOut">
               <a:rPr lang="en-US" dirty="0"/>
-              <a:t>10/11/2018</a:t>
+              <a:t>10/18/2018</a:t>
             </a:fld>
             <a:endParaRPr lang="en-US" dirty="0"/>
           </a:p>
@@ -4311,7 +4314,7 @@
           <a:p>
             <a:fld id="{9796027F-7875-4030-9381-8BD8C4F21935}" type="datetimeFigureOut">
               <a:rPr lang="en-US" dirty="0"/>
-              <a:t>10/11/2018</a:t>
+              <a:t>10/18/2018</a:t>
             </a:fld>
             <a:endParaRPr lang="en-US" dirty="0"/>
           </a:p>
@@ -4424,7 +4427,7 @@
           <a:p>
             <a:fld id="{4509A250-FF31-4206-8172-F9D3106AACB1}" type="datetimeFigureOut">
               <a:rPr lang="en-US" dirty="0"/>
-              <a:t>10/11/2018</a:t>
+              <a:t>10/18/2018</a:t>
             </a:fld>
             <a:endParaRPr lang="en-US" dirty="0"/>
           </a:p>
@@ -4514,7 +4517,7 @@
           <a:p>
             <a:fld id="{4509A250-FF31-4206-8172-F9D3106AACB1}" type="datetimeFigureOut">
               <a:rPr lang="en-US" dirty="0"/>
-              <a:t>10/11/2018</a:t>
+              <a:t>10/18/2018</a:t>
             </a:fld>
             <a:endParaRPr lang="en-US" dirty="0"/>
           </a:p>
@@ -4788,7 +4791,7 @@
           <a:p>
             <a:fld id="{4509A250-FF31-4206-8172-F9D3106AACB1}" type="datetimeFigureOut">
               <a:rPr lang="en-US" dirty="0"/>
-              <a:t>10/11/2018</a:t>
+              <a:t>10/18/2018</a:t>
             </a:fld>
             <a:endParaRPr lang="en-US" dirty="0"/>
           </a:p>
@@ -5058,7 +5061,7 @@
           <a:p>
             <a:fld id="{4509A250-FF31-4206-8172-F9D3106AACB1}" type="datetimeFigureOut">
               <a:rPr lang="en-US" dirty="0"/>
-              <a:t>10/11/2018</a:t>
+              <a:t>10/18/2018</a:t>
             </a:fld>
             <a:endParaRPr lang="en-US" dirty="0"/>
           </a:p>
@@ -5482,7 +5485,7 @@
           <a:p>
             <a:fld id="{4AAD347D-5ACD-4C99-B74B-A9C85AD731AF}" type="datetimeFigureOut">
               <a:rPr lang="en-US" dirty="0"/>
-              <a:t>10/11/2018</a:t>
+              <a:t>10/18/2018</a:t>
             </a:fld>
             <a:endParaRPr lang="en-US" dirty="0"/>
           </a:p>
@@ -6651,6 +6654,346 @@
 </p:sld>
 </file>
 
+<file path=ppt/slides/slide6.xml><?xml version="1.0" encoding="utf-8"?>
+<p:sld xmlns:a="http://schemas.openxmlformats.org/drawingml/2006/main" xmlns:r="http://schemas.openxmlformats.org/officeDocument/2006/relationships" xmlns:p="http://schemas.openxmlformats.org/presentationml/2006/main">
+  <p:cSld>
+    <p:spTree>
+      <p:nvGrpSpPr>
+        <p:cNvPr id="1" name=""/>
+        <p:cNvGrpSpPr/>
+        <p:nvPr/>
+      </p:nvGrpSpPr>
+      <p:grpSpPr>
+        <a:xfrm>
+          <a:off x="0" y="0"/>
+          <a:ext cx="0" cy="0"/>
+          <a:chOff x="0" y="0"/>
+          <a:chExt cx="0" cy="0"/>
+        </a:xfrm>
+      </p:grpSpPr>
+      <p:sp>
+        <p:nvSpPr>
+          <p:cNvPr id="2" name="Title 1"/>
+          <p:cNvSpPr>
+            <a:spLocks noGrp="1"/>
+          </p:cNvSpPr>
+          <p:nvPr>
+            <p:ph type="title"/>
+          </p:nvPr>
+        </p:nvSpPr>
+        <p:spPr/>
+        <p:txBody>
+          <a:bodyPr/>
+          <a:lstStyle/>
+          <a:p>
+            <a:r>
+              <a:rPr lang="en-AU" dirty="0" smtClean="0"/>
+              <a:t>Product backlog		</a:t>
+            </a:r>
+            <a:endParaRPr lang="en-AU" dirty="0"/>
+          </a:p>
+        </p:txBody>
+      </p:sp>
+      <p:sp>
+        <p:nvSpPr>
+          <p:cNvPr id="3" name="Content Placeholder 2"/>
+          <p:cNvSpPr>
+            <a:spLocks noGrp="1"/>
+          </p:cNvSpPr>
+          <p:nvPr>
+            <p:ph idx="1"/>
+          </p:nvPr>
+        </p:nvSpPr>
+        <p:spPr/>
+        <p:txBody>
+          <a:bodyPr/>
+          <a:lstStyle/>
+          <a:p>
+            <a:r>
+              <a:rPr lang="en-AU" dirty="0" smtClean="0"/>
+              <a:t>Have a Camera rig, smooth and responsive to player feedback that is enjoyable on both x/z and y axis, with a scroll. Better than what is it now.</a:t>
+            </a:r>
+          </a:p>
+          <a:p>
+            <a:r>
+              <a:rPr lang="en-AU" dirty="0" smtClean="0"/>
+              <a:t>Have another animation, with another attack, to create interest in the charge mechanic usage. Left, and right click.</a:t>
+            </a:r>
+          </a:p>
+          <a:p>
+            <a:r>
+              <a:rPr lang="en-AU" dirty="0" smtClean="0"/>
+              <a:t>Have a combo counter, onscreen. Making strings of attacks mean more.</a:t>
+            </a:r>
+          </a:p>
+          <a:p>
+            <a:r>
+              <a:rPr lang="en-AU" dirty="0" smtClean="0"/>
+              <a:t>Have a dash that works</a:t>
+            </a:r>
+          </a:p>
+          <a:p>
+            <a:r>
+              <a:rPr lang="en-AU" dirty="0" smtClean="0"/>
+              <a:t>Have a super damage barrier that shows numbers</a:t>
+            </a:r>
+          </a:p>
+          <a:p>
+            <a:r>
+              <a:rPr lang="en-AU" dirty="0" smtClean="0"/>
+              <a:t>Have a protect shield that has a breakpoint and shows its health, in number and opacity. – not invulnerability.</a:t>
+            </a:r>
+          </a:p>
+          <a:p>
+            <a:pPr marL="0" indent="0">
+              <a:buNone/>
+            </a:pPr>
+            <a:endParaRPr lang="en-AU" dirty="0" smtClean="0"/>
+          </a:p>
+          <a:p>
+            <a:endParaRPr lang="en-AU" dirty="0" smtClean="0"/>
+          </a:p>
+          <a:p>
+            <a:endParaRPr lang="en-AU" dirty="0"/>
+          </a:p>
+        </p:txBody>
+      </p:sp>
+    </p:spTree>
+    <p:extLst>
+      <p:ext uri="{BB962C8B-B14F-4D97-AF65-F5344CB8AC3E}">
+        <p14:creationId xmlns:p14="http://schemas.microsoft.com/office/powerpoint/2010/main" val="1758218013"/>
+      </p:ext>
+    </p:extLst>
+  </p:cSld>
+  <p:clrMapOvr>
+    <a:masterClrMapping/>
+  </p:clrMapOvr>
+</p:sld>
+</file>
+
+<file path=ppt/slides/slide7.xml><?xml version="1.0" encoding="utf-8"?>
+<p:sld xmlns:a="http://schemas.openxmlformats.org/drawingml/2006/main" xmlns:r="http://schemas.openxmlformats.org/officeDocument/2006/relationships" xmlns:p="http://schemas.openxmlformats.org/presentationml/2006/main">
+  <p:cSld>
+    <p:spTree>
+      <p:nvGrpSpPr>
+        <p:cNvPr id="1" name=""/>
+        <p:cNvGrpSpPr/>
+        <p:nvPr/>
+      </p:nvGrpSpPr>
+      <p:grpSpPr>
+        <a:xfrm>
+          <a:off x="0" y="0"/>
+          <a:ext cx="0" cy="0"/>
+          <a:chOff x="0" y="0"/>
+          <a:chExt cx="0" cy="0"/>
+        </a:xfrm>
+      </p:grpSpPr>
+      <p:sp>
+        <p:nvSpPr>
+          <p:cNvPr id="2" name="Title 1"/>
+          <p:cNvSpPr>
+            <a:spLocks noGrp="1"/>
+          </p:cNvSpPr>
+          <p:nvPr>
+            <p:ph type="title"/>
+          </p:nvPr>
+        </p:nvSpPr>
+        <p:spPr/>
+        <p:txBody>
+          <a:bodyPr/>
+          <a:lstStyle/>
+          <a:p>
+            <a:r>
+              <a:rPr lang="en-AU" dirty="0" smtClean="0"/>
+              <a:t>Necessary to implement.</a:t>
+            </a:r>
+            <a:endParaRPr lang="en-AU" dirty="0"/>
+          </a:p>
+        </p:txBody>
+      </p:sp>
+      <p:sp>
+        <p:nvSpPr>
+          <p:cNvPr id="3" name="Content Placeholder 2"/>
+          <p:cNvSpPr>
+            <a:spLocks noGrp="1"/>
+          </p:cNvSpPr>
+          <p:nvPr>
+            <p:ph idx="1"/>
+          </p:nvPr>
+        </p:nvSpPr>
+        <p:spPr/>
+        <p:txBody>
+          <a:bodyPr/>
+          <a:lstStyle/>
+          <a:p>
+            <a:r>
+              <a:rPr lang="en-AU" dirty="0" smtClean="0"/>
+              <a:t>Camera rig</a:t>
+            </a:r>
+          </a:p>
+          <a:p>
+            <a:r>
+              <a:rPr lang="en-AU" dirty="0" smtClean="0"/>
+              <a:t>Combo meter/number</a:t>
+            </a:r>
+          </a:p>
+        </p:txBody>
+      </p:sp>
+    </p:spTree>
+    <p:extLst>
+      <p:ext uri="{BB962C8B-B14F-4D97-AF65-F5344CB8AC3E}">
+        <p14:creationId xmlns:p14="http://schemas.microsoft.com/office/powerpoint/2010/main" val="4134340717"/>
+      </p:ext>
+    </p:extLst>
+  </p:cSld>
+  <p:clrMapOvr>
+    <a:masterClrMapping/>
+  </p:clrMapOvr>
+</p:sld>
+</file>
+
+<file path=ppt/slides/slide8.xml><?xml version="1.0" encoding="utf-8"?>
+<p:sld xmlns:a="http://schemas.openxmlformats.org/drawingml/2006/main" xmlns:r="http://schemas.openxmlformats.org/officeDocument/2006/relationships" xmlns:p="http://schemas.openxmlformats.org/presentationml/2006/main">
+  <p:cSld>
+    <p:spTree>
+      <p:nvGrpSpPr>
+        <p:cNvPr id="1" name=""/>
+        <p:cNvGrpSpPr/>
+        <p:nvPr/>
+      </p:nvGrpSpPr>
+      <p:grpSpPr>
+        <a:xfrm>
+          <a:off x="0" y="0"/>
+          <a:ext cx="0" cy="0"/>
+          <a:chOff x="0" y="0"/>
+          <a:chExt cx="0" cy="0"/>
+        </a:xfrm>
+      </p:grpSpPr>
+      <p:sp>
+        <p:nvSpPr>
+          <p:cNvPr id="2" name="Title 1"/>
+          <p:cNvSpPr>
+            <a:spLocks noGrp="1"/>
+          </p:cNvSpPr>
+          <p:nvPr>
+            <p:ph type="title"/>
+          </p:nvPr>
+        </p:nvSpPr>
+        <p:spPr/>
+        <p:txBody>
+          <a:bodyPr/>
+          <a:lstStyle/>
+          <a:p>
+            <a:r>
+              <a:rPr lang="en-AU" dirty="0" smtClean="0"/>
+              <a:t>Order to completion/time spent</a:t>
+            </a:r>
+            <a:br>
+              <a:rPr lang="en-AU" dirty="0" smtClean="0"/>
+            </a:br>
+            <a:r>
+              <a:rPr lang="en-AU" dirty="0" smtClean="0"/>
+              <a:t/>
+            </a:r>
+            <a:br>
+              <a:rPr lang="en-AU" dirty="0" smtClean="0"/>
+            </a:br>
+            <a:endParaRPr lang="en-AU" dirty="0"/>
+          </a:p>
+        </p:txBody>
+      </p:sp>
+      <p:sp>
+        <p:nvSpPr>
+          <p:cNvPr id="3" name="Content Placeholder 2"/>
+          <p:cNvSpPr>
+            <a:spLocks noGrp="1"/>
+          </p:cNvSpPr>
+          <p:nvPr>
+            <p:ph idx="1"/>
+          </p:nvPr>
+        </p:nvSpPr>
+        <p:spPr/>
+        <p:txBody>
+          <a:bodyPr/>
+          <a:lstStyle/>
+          <a:p>
+            <a:r>
+              <a:rPr lang="en-AU" b="1" dirty="0" smtClean="0"/>
+              <a:t>This Weeks</a:t>
+            </a:r>
+          </a:p>
+          <a:p>
+            <a:r>
+              <a:rPr lang="en-AU" dirty="0" smtClean="0"/>
+              <a:t>Camera rig							30 mins – 45 mins</a:t>
+            </a:r>
+          </a:p>
+          <a:p>
+            <a:r>
+              <a:rPr lang="en-AU" dirty="0" smtClean="0"/>
+              <a:t>Combo Meter						2-3 hours</a:t>
+            </a:r>
+          </a:p>
+          <a:p>
+            <a:r>
+              <a:rPr lang="en-AU" dirty="0" smtClean="0"/>
+              <a:t>Find animation						2 hours</a:t>
+            </a:r>
+          </a:p>
+          <a:p>
+            <a:endParaRPr lang="en-AU" dirty="0"/>
+          </a:p>
+          <a:p>
+            <a:r>
+              <a:rPr lang="en-AU" b="1" dirty="0" smtClean="0"/>
+              <a:t>Next weeks</a:t>
+            </a:r>
+          </a:p>
+          <a:p>
+            <a:r>
+              <a:rPr lang="en-AU" dirty="0" smtClean="0"/>
+              <a:t>Shield								1 hour</a:t>
+            </a:r>
+          </a:p>
+          <a:p>
+            <a:r>
+              <a:rPr lang="en-AU" dirty="0" smtClean="0"/>
+              <a:t>Damage barrier					30 mins</a:t>
+            </a:r>
+          </a:p>
+          <a:p>
+            <a:r>
+              <a:rPr lang="en-AU" dirty="0" smtClean="0"/>
+              <a:t>Dash 								30 mins</a:t>
+            </a:r>
+          </a:p>
+          <a:p>
+            <a:endParaRPr lang="en-AU" b="1" dirty="0" smtClean="0"/>
+          </a:p>
+          <a:p>
+            <a:endParaRPr lang="en-AU" dirty="0" smtClean="0"/>
+          </a:p>
+          <a:p>
+            <a:endParaRPr lang="en-AU" dirty="0" smtClean="0"/>
+          </a:p>
+          <a:p>
+            <a:endParaRPr lang="en-AU" dirty="0"/>
+          </a:p>
+        </p:txBody>
+      </p:sp>
+    </p:spTree>
+    <p:extLst>
+      <p:ext uri="{BB962C8B-B14F-4D97-AF65-F5344CB8AC3E}">
+        <p14:creationId xmlns:p14="http://schemas.microsoft.com/office/powerpoint/2010/main" val="2128178354"/>
+      </p:ext>
+    </p:extLst>
+  </p:cSld>
+  <p:clrMapOvr>
+    <a:masterClrMapping/>
+  </p:clrMapOvr>
+</p:sld>
+</file>
+
 <file path=ppt/theme/theme1.xml><?xml version="1.0" encoding="utf-8"?>
 <a:theme xmlns:a="http://schemas.openxmlformats.org/drawingml/2006/main" name="Ion">
   <a:themeElements>

</xml_diff>